<commit_message>
saving all progress for 0211
</commit_message>
<xml_diff>
--- a/Data/sgRNA/Figure5/100mer_template.pptx
+++ b/Data/sgRNA/Figure5/100mer_template.pptx
@@ -22535,7 +22535,7 @@
         <p:spPr>
           <a:xfrm>
             <a:off x="509905" y="4321810"/>
-            <a:ext cx="10505440" cy="368300"/>
+            <a:ext cx="10668000" cy="368300"/>
           </a:xfrm>
           <a:prstGeom prst="rect">
             <a:avLst/>
@@ -22549,7 +22549,7 @@
           <a:p>
             <a:r>
               <a:rPr lang="en-US"/>
-              <a:t>C  C  U  C  A U  G  A  G      C  A  C  G G  A  A  C  U  C        A  U G         C  G A  U  C  U  A      G  A  A</a:t>
+              <a:t>C  C  U  C  A U  G  A  G      C  A  C  G G  A  A  C  U  C        A  U G         C  G A  U  C  U  A      G  A  A  3’ </a:t>
             </a:r>
             <a:endParaRPr lang="en-US"/>
           </a:p>

</xml_diff>